<commit_message>
final commit of RMD, Knit file, and presentation
</commit_message>
<xml_diff>
--- a/DDS Analytics Presentation.pptx
+++ b/DDS Analytics Presentation.pptx
@@ -6,19 +6,19 @@
   </p:sldMasterIdLst>
   <p:sldIdLst>
     <p:sldId id="259" r:id="rId2"/>
-    <p:sldId id="257" r:id="rId3"/>
-    <p:sldId id="279" r:id="rId4"/>
-    <p:sldId id="260" r:id="rId5"/>
-    <p:sldId id="261" r:id="rId6"/>
-    <p:sldId id="273" r:id="rId7"/>
-    <p:sldId id="271" r:id="rId8"/>
-    <p:sldId id="268" r:id="rId9"/>
-    <p:sldId id="275" r:id="rId10"/>
-    <p:sldId id="274" r:id="rId11"/>
-    <p:sldId id="276" r:id="rId12"/>
-    <p:sldId id="277" r:id="rId13"/>
-    <p:sldId id="278" r:id="rId14"/>
-    <p:sldId id="265" r:id="rId15"/>
+    <p:sldId id="280" r:id="rId3"/>
+    <p:sldId id="257" r:id="rId4"/>
+    <p:sldId id="279" r:id="rId5"/>
+    <p:sldId id="260" r:id="rId6"/>
+    <p:sldId id="281" r:id="rId7"/>
+    <p:sldId id="261" r:id="rId8"/>
+    <p:sldId id="273" r:id="rId9"/>
+    <p:sldId id="268" r:id="rId10"/>
+    <p:sldId id="275" r:id="rId11"/>
+    <p:sldId id="274" r:id="rId12"/>
+    <p:sldId id="276" r:id="rId13"/>
+    <p:sldId id="277" r:id="rId14"/>
+    <p:sldId id="278" r:id="rId15"/>
     <p:sldId id="264" r:id="rId16"/>
   </p:sldIdLst>
   <p:sldSz cx="12192000" cy="6858000"/>
@@ -629,7 +629,7 @@
             <a:fld id="{B61BEF0D-F0BB-DE4B-95CE-6DB70DBA9567}" type="datetimeFigureOut">
               <a:rPr lang="en-US" dirty="0"/>
               <a:pPr/>
-              <a:t>2/27/2021</a:t>
+              <a:t>2/28/2021</a:t>
             </a:fld>
             <a:endParaRPr lang="en-US" dirty="0"/>
           </a:p>
@@ -922,7 +922,7 @@
             <a:fld id="{B61BEF0D-F0BB-DE4B-95CE-6DB70DBA9567}" type="datetimeFigureOut">
               <a:rPr lang="en-US" dirty="0"/>
               <a:pPr/>
-              <a:t>2/27/2021</a:t>
+              <a:t>2/28/2021</a:t>
             </a:fld>
             <a:endParaRPr lang="en-US" dirty="0"/>
           </a:p>
@@ -1167,7 +1167,7 @@
             <a:fld id="{B61BEF0D-F0BB-DE4B-95CE-6DB70DBA9567}" type="datetimeFigureOut">
               <a:rPr lang="en-US" dirty="0"/>
               <a:pPr/>
-              <a:t>2/27/2021</a:t>
+              <a:t>2/28/2021</a:t>
             </a:fld>
             <a:endParaRPr lang="en-US" dirty="0"/>
           </a:p>
@@ -1704,7 +1704,7 @@
             <a:fld id="{B61BEF0D-F0BB-DE4B-95CE-6DB70DBA9567}" type="datetimeFigureOut">
               <a:rPr lang="en-US" dirty="0"/>
               <a:pPr/>
-              <a:t>2/27/2021</a:t>
+              <a:t>2/28/2021</a:t>
             </a:fld>
             <a:endParaRPr lang="en-US" dirty="0"/>
           </a:p>
@@ -1949,7 +1949,7 @@
             <a:fld id="{B61BEF0D-F0BB-DE4B-95CE-6DB70DBA9567}" type="datetimeFigureOut">
               <a:rPr lang="en-US" dirty="0"/>
               <a:pPr/>
-              <a:t>2/27/2021</a:t>
+              <a:t>2/28/2021</a:t>
             </a:fld>
             <a:endParaRPr lang="en-US" dirty="0"/>
           </a:p>
@@ -2478,7 +2478,7 @@
             <a:fld id="{B61BEF0D-F0BB-DE4B-95CE-6DB70DBA9567}" type="datetimeFigureOut">
               <a:rPr lang="en-US" dirty="0"/>
               <a:pPr/>
-              <a:t>2/27/2021</a:t>
+              <a:t>2/28/2021</a:t>
             </a:fld>
             <a:endParaRPr lang="en-US" dirty="0"/>
           </a:p>
@@ -2772,7 +2772,7 @@
             <a:fld id="{B61BEF0D-F0BB-DE4B-95CE-6DB70DBA9567}" type="datetimeFigureOut">
               <a:rPr lang="en-US" dirty="0"/>
               <a:pPr/>
-              <a:t>2/27/2021</a:t>
+              <a:t>2/28/2021</a:t>
             </a:fld>
             <a:endParaRPr lang="en-US" dirty="0"/>
           </a:p>
@@ -2943,7 +2943,7 @@
             <a:fld id="{B61BEF0D-F0BB-DE4B-95CE-6DB70DBA9567}" type="datetimeFigureOut">
               <a:rPr lang="en-US" dirty="0"/>
               <a:pPr/>
-              <a:t>2/27/2021</a:t>
+              <a:t>2/28/2021</a:t>
             </a:fld>
             <a:endParaRPr lang="en-US" dirty="0"/>
           </a:p>
@@ -3120,7 +3120,7 @@
             <a:fld id="{B61BEF0D-F0BB-DE4B-95CE-6DB70DBA9567}" type="datetimeFigureOut">
               <a:rPr lang="en-US" dirty="0"/>
               <a:pPr/>
-              <a:t>2/27/2021</a:t>
+              <a:t>2/28/2021</a:t>
             </a:fld>
             <a:endParaRPr lang="en-US" dirty="0"/>
           </a:p>
@@ -3287,7 +3287,7 @@
             <a:fld id="{B61BEF0D-F0BB-DE4B-95CE-6DB70DBA9567}" type="datetimeFigureOut">
               <a:rPr lang="en-US" dirty="0"/>
               <a:pPr/>
-              <a:t>2/27/2021</a:t>
+              <a:t>2/28/2021</a:t>
             </a:fld>
             <a:endParaRPr lang="en-US" dirty="0"/>
           </a:p>
@@ -3535,7 +3535,7 @@
             <a:fld id="{B61BEF0D-F0BB-DE4B-95CE-6DB70DBA9567}" type="datetimeFigureOut">
               <a:rPr lang="en-US" dirty="0"/>
               <a:pPr/>
-              <a:t>2/27/2021</a:t>
+              <a:t>2/28/2021</a:t>
             </a:fld>
             <a:endParaRPr lang="en-US" dirty="0"/>
           </a:p>
@@ -3829,7 +3829,7 @@
             <a:fld id="{B61BEF0D-F0BB-DE4B-95CE-6DB70DBA9567}" type="datetimeFigureOut">
               <a:rPr lang="en-US" dirty="0"/>
               <a:pPr/>
-              <a:t>2/27/2021</a:t>
+              <a:t>2/28/2021</a:t>
             </a:fld>
             <a:endParaRPr lang="en-US" dirty="0"/>
           </a:p>
@@ -4268,7 +4268,7 @@
             <a:fld id="{B61BEF0D-F0BB-DE4B-95CE-6DB70DBA9567}" type="datetimeFigureOut">
               <a:rPr lang="en-US" dirty="0"/>
               <a:pPr/>
-              <a:t>2/27/2021</a:t>
+              <a:t>2/28/2021</a:t>
             </a:fld>
             <a:endParaRPr lang="en-US" dirty="0"/>
           </a:p>
@@ -4383,7 +4383,7 @@
             <a:fld id="{B61BEF0D-F0BB-DE4B-95CE-6DB70DBA9567}" type="datetimeFigureOut">
               <a:rPr lang="en-US" dirty="0"/>
               <a:pPr/>
-              <a:t>2/27/2021</a:t>
+              <a:t>2/28/2021</a:t>
             </a:fld>
             <a:endParaRPr lang="en-US" dirty="0"/>
           </a:p>
@@ -4475,7 +4475,7 @@
             <a:fld id="{B61BEF0D-F0BB-DE4B-95CE-6DB70DBA9567}" type="datetimeFigureOut">
               <a:rPr lang="en-US" dirty="0"/>
               <a:pPr/>
-              <a:t>2/27/2021</a:t>
+              <a:t>2/28/2021</a:t>
             </a:fld>
             <a:endParaRPr lang="en-US" dirty="0"/>
           </a:p>
@@ -4755,7 +4755,7 @@
             <a:fld id="{B61BEF0D-F0BB-DE4B-95CE-6DB70DBA9567}" type="datetimeFigureOut">
               <a:rPr lang="en-US" dirty="0"/>
               <a:pPr/>
-              <a:t>2/27/2021</a:t>
+              <a:t>2/28/2021</a:t>
             </a:fld>
             <a:endParaRPr lang="en-US" dirty="0"/>
           </a:p>
@@ -5043,7 +5043,7 @@
             <a:fld id="{B61BEF0D-F0BB-DE4B-95CE-6DB70DBA9567}" type="datetimeFigureOut">
               <a:rPr lang="en-US" dirty="0"/>
               <a:pPr/>
-              <a:t>2/27/2021</a:t>
+              <a:t>2/28/2021</a:t>
             </a:fld>
             <a:endParaRPr lang="en-US" dirty="0"/>
           </a:p>
@@ -5570,7 +5570,7 @@
             <a:fld id="{B61BEF0D-F0BB-DE4B-95CE-6DB70DBA9567}" type="datetimeFigureOut">
               <a:rPr lang="en-US" dirty="0"/>
               <a:pPr/>
-              <a:t>2/27/2021</a:t>
+              <a:t>2/28/2021</a:t>
             </a:fld>
             <a:endParaRPr lang="en-US" dirty="0"/>
           </a:p>
@@ -6121,54 +6121,88 @@
             <p:ph type="title"/>
           </p:nvPr>
         </p:nvSpPr>
-        <p:spPr/>
-        <p:txBody>
-          <a:bodyPr/>
-          <a:lstStyle/>
-          <a:p>
-            <a:r>
-              <a:rPr lang="en-US" dirty="0"/>
-              <a:t>Executive Summary</a:t>
-            </a:r>
-          </a:p>
-        </p:txBody>
-      </p:sp>
-      <p:sp>
-        <p:nvSpPr>
-          <p:cNvPr id="3" name="Content Placeholder 2">
+        <p:spPr>
+          <a:xfrm>
+            <a:off x="1510815" y="2673626"/>
+            <a:ext cx="10018713" cy="1752599"/>
+          </a:xfrm>
+        </p:spPr>
+        <p:txBody>
+          <a:bodyPr>
+            <a:noAutofit/>
+          </a:bodyPr>
+          <a:lstStyle/>
+          <a:p>
+            <a:r>
+              <a:rPr lang="en-US" sz="3200" dirty="0"/>
+              <a:t>MSDS 6306: Case Study 2</a:t>
+            </a:r>
+            <a:br>
+              <a:rPr lang="en-US" sz="3200" dirty="0"/>
+            </a:br>
+            <a:r>
+              <a:rPr lang="en-US" sz="3200" dirty="0" err="1"/>
+              <a:t>DDSAnalytics</a:t>
+            </a:r>
+            <a:br>
+              <a:rPr lang="en-US" sz="3200" dirty="0"/>
+            </a:br>
+            <a:br>
+              <a:rPr lang="en-US" sz="3200" dirty="0"/>
+            </a:br>
+            <a:br>
+              <a:rPr lang="en-US" sz="3200" dirty="0"/>
+            </a:br>
+            <a:br>
+              <a:rPr lang="en-US" sz="3200" dirty="0"/>
+            </a:br>
+            <a:br>
+              <a:rPr lang="en-US" sz="3200" dirty="0"/>
+            </a:br>
+            <a:r>
+              <a:rPr lang="en-US" sz="3200" dirty="0"/>
+              <a:t>Jason Herbaugh</a:t>
+            </a:r>
+            <a:br>
+              <a:rPr lang="en-US" sz="3200" dirty="0"/>
+            </a:br>
+            <a:r>
+              <a:rPr lang="en-US" sz="3200" dirty="0"/>
+              <a:t>2/2/8/2021</a:t>
+            </a:r>
+          </a:p>
+        </p:txBody>
+      </p:sp>
+      <p:pic>
+        <p:nvPicPr>
+          <p:cNvPr id="4" name="Picture 3">
             <a:extLst>
               <a:ext uri="{FF2B5EF4-FFF2-40B4-BE49-F238E27FC236}">
-                <a16:creationId xmlns:a16="http://schemas.microsoft.com/office/drawing/2014/main" id="{F79D2C27-3C8E-4444-8CAC-1E6D79A0F3EB}"/>
+                <a16:creationId xmlns:a16="http://schemas.microsoft.com/office/drawing/2014/main" id="{35AC11AC-AB87-4351-8851-D38F6BA4AC46}"/>
               </a:ext>
             </a:extLst>
           </p:cNvPr>
-          <p:cNvSpPr>
-            <a:spLocks noGrp="1"/>
-          </p:cNvSpPr>
-          <p:nvPr>
-            <p:ph idx="4294967295"/>
-          </p:nvPr>
-        </p:nvSpPr>
+          <p:cNvPicPr>
+            <a:picLocks noChangeAspect="1"/>
+          </p:cNvPicPr>
+          <p:nvPr/>
+        </p:nvPicPr>
+        <p:blipFill>
+          <a:blip r:embed="rId2"/>
+          <a:stretch>
+            <a:fillRect/>
+          </a:stretch>
+        </p:blipFill>
         <p:spPr>
           <a:xfrm>
-            <a:off x="2173288" y="2667000"/>
-            <a:ext cx="10018712" cy="3124200"/>
+            <a:off x="3960576" y="2752725"/>
+            <a:ext cx="5119189" cy="1352550"/>
           </a:xfrm>
+          <a:prstGeom prst="rect">
+            <a:avLst/>
+          </a:prstGeom>
         </p:spPr>
-        <p:txBody>
-          <a:bodyPr/>
-          <a:lstStyle/>
-          <a:p>
-            <a:pPr marL="0" indent="0">
-              <a:buNone/>
-            </a:pPr>
-            <a:r>
-              <a:rPr lang="en-US" dirty="0"/>
-              <a:t>DDS Analytics is analyzing talent management solutions for Fortune 100 companies. To gain a competitive edge over the competition they want to use data science for talent management. They want to investigate salary prediction and attrition classification using data science techniques. </a:t>
-            </a:r>
-          </a:p>
-        </p:txBody>
-      </p:sp>
+      </p:pic>
     </p:spTree>
     <p:extLst>
       <p:ext uri="{BB962C8B-B14F-4D97-AF65-F5344CB8AC3E}">
@@ -6253,8 +6287,8 @@
         </p:nvSpPr>
         <p:spPr>
           <a:xfrm>
-            <a:off x="2173288" y="2667000"/>
-            <a:ext cx="10018712" cy="3124200"/>
+            <a:off x="1171932" y="2615184"/>
+            <a:ext cx="10707689" cy="3102864"/>
           </a:xfrm>
         </p:spPr>
         <p:txBody>
@@ -6262,256 +6296,89 @@
           <a:lstStyle/>
           <a:p>
             <a:r>
-              <a:rPr lang="en-US" dirty="0"/>
-              <a:t>SVN Model</a:t>
+              <a:rPr lang="en-US" sz="2000" dirty="0"/>
+              <a:t>Random Forest</a:t>
             </a:r>
           </a:p>
           <a:p>
             <a:pPr lvl="1"/>
             <a:r>
-              <a:rPr lang="en-US" dirty="0"/>
-              <a:t>Segregate given dataset in best possible way</a:t>
+              <a:rPr lang="en-US" sz="1700" dirty="0"/>
+              <a:t>Select Random samples from Attrition</a:t>
             </a:r>
           </a:p>
           <a:p>
             <a:pPr lvl="1"/>
             <a:r>
-              <a:rPr lang="en-US" dirty="0"/>
-              <a:t>Distance between nearest point as margin</a:t>
+              <a:rPr lang="en-US" sz="1700" dirty="0"/>
+              <a:t>Construct Decision Tree for each sample</a:t>
+            </a:r>
+          </a:p>
+          <a:p>
+            <a:pPr lvl="2"/>
+            <a:r>
+              <a:rPr lang="en-US" sz="1500" dirty="0"/>
+              <a:t>Prediction result from each decision</a:t>
             </a:r>
           </a:p>
           <a:p>
             <a:pPr lvl="1"/>
             <a:r>
-              <a:rPr lang="en-US" dirty="0"/>
-              <a:t>Select Hyperplane with max possible margin</a:t>
+              <a:rPr lang="en-US" sz="1700" dirty="0"/>
+              <a:t>Perform a vote for each predicted result</a:t>
             </a:r>
           </a:p>
           <a:p>
             <a:pPr lvl="1"/>
-            <a:endParaRPr lang="en-US" dirty="0"/>
+            <a:r>
+              <a:rPr lang="en-US" sz="1700" dirty="0"/>
+              <a:t>Select Prediction result with most votes</a:t>
+            </a:r>
           </a:p>
           <a:p>
             <a:pPr lvl="1"/>
             <a:endParaRPr lang="en-US" dirty="0"/>
           </a:p>
-        </p:txBody>
-      </p:sp>
-      <p:sp>
-        <p:nvSpPr>
-          <p:cNvPr id="8" name="TextBox 7">
+          <a:p>
+            <a:pPr lvl="1"/>
+            <a:endParaRPr lang="en-US" dirty="0"/>
+          </a:p>
+        </p:txBody>
+      </p:sp>
+      <p:pic>
+        <p:nvPicPr>
+          <p:cNvPr id="7" name="Picture 6">
             <a:extLst>
               <a:ext uri="{FF2B5EF4-FFF2-40B4-BE49-F238E27FC236}">
-                <a16:creationId xmlns:a16="http://schemas.microsoft.com/office/drawing/2014/main" id="{0FADE701-F564-4CEE-8C0D-14B70BB04917}"/>
+                <a16:creationId xmlns:a16="http://schemas.microsoft.com/office/drawing/2014/main" id="{1F94D6F6-01A7-4928-B47D-A774BC9E8B60}"/>
               </a:ext>
             </a:extLst>
           </p:cNvPr>
-          <p:cNvSpPr txBox="1"/>
+          <p:cNvPicPr>
+            <a:picLocks noChangeAspect="1"/>
+          </p:cNvPicPr>
           <p:nvPr/>
-        </p:nvSpPr>
+        </p:nvPicPr>
+        <p:blipFill>
+          <a:blip r:embed="rId2"/>
+          <a:stretch>
+            <a:fillRect/>
+          </a:stretch>
+        </p:blipFill>
         <p:spPr>
           <a:xfrm>
-            <a:off x="8223281" y="2078772"/>
-            <a:ext cx="3049668" cy="4093428"/>
+            <a:off x="6644244" y="2438399"/>
+            <a:ext cx="4515768" cy="3034554"/>
           </a:xfrm>
           <a:prstGeom prst="rect">
             <a:avLst/>
           </a:prstGeom>
-          <a:noFill/>
         </p:spPr>
-        <p:txBody>
-          <a:bodyPr wrap="square">
-            <a:spAutoFit/>
-          </a:bodyPr>
-          <a:lstStyle/>
-          <a:p>
-            <a:r>
-              <a:rPr lang="en-US" sz="1000" dirty="0"/>
-              <a:t>Confusion Matrix and Statistics</a:t>
-            </a:r>
-          </a:p>
-          <a:p>
-            <a:endParaRPr lang="en-US" sz="1000" dirty="0"/>
-          </a:p>
-          <a:p>
-            <a:r>
-              <a:rPr lang="en-US" sz="1000" dirty="0"/>
-              <a:t>     </a:t>
-            </a:r>
-            <a:r>
-              <a:rPr lang="en-US" sz="1000" dirty="0" err="1"/>
-              <a:t>predTrainsvm</a:t>
-            </a:r>
-            <a:endParaRPr lang="en-US" sz="1000" dirty="0"/>
-          </a:p>
-          <a:p>
-            <a:r>
-              <a:rPr lang="en-US" sz="1000" dirty="0"/>
-              <a:t>       No Yes</a:t>
-            </a:r>
-          </a:p>
-          <a:p>
-            <a:r>
-              <a:rPr lang="en-US" sz="1000" dirty="0"/>
-              <a:t>  No  223   0</a:t>
-            </a:r>
-          </a:p>
-          <a:p>
-            <a:r>
-              <a:rPr lang="en-US" sz="1000" dirty="0"/>
-              <a:t>  Yes  34   4</a:t>
-            </a:r>
-          </a:p>
-          <a:p>
-            <a:r>
-              <a:rPr lang="en-US" sz="1000" dirty="0"/>
-              <a:t>                                          </a:t>
-            </a:r>
-          </a:p>
-          <a:p>
-            <a:r>
-              <a:rPr lang="en-US" sz="1000" dirty="0"/>
-              <a:t>               Accuracy : 0.8697          </a:t>
-            </a:r>
-          </a:p>
-          <a:p>
-            <a:r>
-              <a:rPr lang="en-US" sz="1000" dirty="0"/>
-              <a:t>                 95% CI : (0.8227, 0.9081)</a:t>
-            </a:r>
-          </a:p>
-          <a:p>
-            <a:r>
-              <a:rPr lang="en-US" sz="1000" dirty="0"/>
-              <a:t>    No Information Rate : 0.9847          </a:t>
-            </a:r>
-          </a:p>
-          <a:p>
-            <a:r>
-              <a:rPr lang="en-US" sz="1000" dirty="0"/>
-              <a:t>    P-Value [Acc &gt; NIR] : 1               </a:t>
-            </a:r>
-          </a:p>
-          <a:p>
-            <a:r>
-              <a:rPr lang="en-US" sz="1000" dirty="0"/>
-              <a:t>                                          </a:t>
-            </a:r>
-          </a:p>
-          <a:p>
-            <a:r>
-              <a:rPr lang="en-US" sz="1000" dirty="0"/>
-              <a:t>                  Kappa : 0.1674          </a:t>
-            </a:r>
-          </a:p>
-          <a:p>
-            <a:r>
-              <a:rPr lang="en-US" sz="1000" dirty="0"/>
-              <a:t>                                          </a:t>
-            </a:r>
-          </a:p>
-          <a:p>
-            <a:r>
-              <a:rPr lang="en-US" sz="1000" dirty="0"/>
-              <a:t> </a:t>
-            </a:r>
-            <a:r>
-              <a:rPr lang="en-US" sz="1000" dirty="0" err="1"/>
-              <a:t>Mcnemar's</a:t>
-            </a:r>
-            <a:r>
-              <a:rPr lang="en-US" sz="1000" dirty="0"/>
-              <a:t> Test P-Value : 0.00000001519   </a:t>
-            </a:r>
-          </a:p>
-          <a:p>
-            <a:r>
-              <a:rPr lang="en-US" sz="1000" dirty="0"/>
-              <a:t>                                          </a:t>
-            </a:r>
-          </a:p>
-          <a:p>
-            <a:r>
-              <a:rPr lang="en-US" sz="1000" dirty="0"/>
-              <a:t>            Sensitivity : 0.8677          </a:t>
-            </a:r>
-          </a:p>
-          <a:p>
-            <a:r>
-              <a:rPr lang="en-US" sz="1000" dirty="0"/>
-              <a:t>            Specificity : 1.0000          </a:t>
-            </a:r>
-          </a:p>
-          <a:p>
-            <a:r>
-              <a:rPr lang="en-US" sz="1000" dirty="0"/>
-              <a:t>         Pos </a:t>
-            </a:r>
-            <a:r>
-              <a:rPr lang="en-US" sz="1000" dirty="0" err="1"/>
-              <a:t>Pred</a:t>
-            </a:r>
-            <a:r>
-              <a:rPr lang="en-US" sz="1000" dirty="0"/>
-              <a:t> Value : 1.0000          </a:t>
-            </a:r>
-          </a:p>
-          <a:p>
-            <a:r>
-              <a:rPr lang="en-US" sz="1000" dirty="0"/>
-              <a:t>         Neg </a:t>
-            </a:r>
-            <a:r>
-              <a:rPr lang="en-US" sz="1000" dirty="0" err="1"/>
-              <a:t>Pred</a:t>
-            </a:r>
-            <a:r>
-              <a:rPr lang="en-US" sz="1000" dirty="0"/>
-              <a:t> Value : 0.1053          </a:t>
-            </a:r>
-          </a:p>
-          <a:p>
-            <a:r>
-              <a:rPr lang="en-US" sz="1000" dirty="0"/>
-              <a:t>             Prevalence : 0.9847          </a:t>
-            </a:r>
-          </a:p>
-          <a:p>
-            <a:r>
-              <a:rPr lang="en-US" sz="1000" dirty="0"/>
-              <a:t>         Detection Rate : 0.8544          </a:t>
-            </a:r>
-          </a:p>
-          <a:p>
-            <a:r>
-              <a:rPr lang="en-US" sz="1000" dirty="0"/>
-              <a:t>   Detection Prevalence : 0.8544          </a:t>
-            </a:r>
-          </a:p>
-          <a:p>
-            <a:r>
-              <a:rPr lang="en-US" sz="1000" dirty="0"/>
-              <a:t>      Balanced Accuracy : 0.9339          </a:t>
-            </a:r>
-          </a:p>
-          <a:p>
-            <a:r>
-              <a:rPr lang="en-US" sz="1000" dirty="0"/>
-              <a:t>                                          </a:t>
-            </a:r>
-          </a:p>
-          <a:p>
-            <a:r>
-              <a:rPr lang="en-US" sz="1000" dirty="0"/>
-              <a:t>       'Positive' Class : No </a:t>
-            </a:r>
-          </a:p>
-        </p:txBody>
-      </p:sp>
+      </p:pic>
     </p:spTree>
     <p:extLst>
       <p:ext uri="{BB962C8B-B14F-4D97-AF65-F5344CB8AC3E}">
-        <p14:creationId xmlns:p14="http://schemas.microsoft.com/office/powerpoint/2010/main" val="1095122572"/>
+        <p14:creationId xmlns:p14="http://schemas.microsoft.com/office/powerpoint/2010/main" val="1845796925"/>
       </p:ext>
     </p:extLst>
   </p:cSld>
@@ -6569,7 +6436,7 @@
           <a:p>
             <a:r>
               <a:rPr lang="en-US" dirty="0"/>
-              <a:t>Salary Model</a:t>
+              <a:t>Attrition Model</a:t>
             </a:r>
           </a:p>
         </p:txBody>
@@ -6592,8 +6459,8 @@
         </p:nvSpPr>
         <p:spPr>
           <a:xfrm>
-            <a:off x="2173288" y="2667000"/>
-            <a:ext cx="10018712" cy="3124200"/>
+            <a:off x="1115569" y="2509459"/>
+            <a:ext cx="10387455" cy="3178126"/>
           </a:xfrm>
         </p:spPr>
         <p:txBody>
@@ -6601,37 +6468,55 @@
           <a:lstStyle/>
           <a:p>
             <a:r>
-              <a:rPr lang="en-US" dirty="0"/>
-              <a:t>KNN</a:t>
+              <a:rPr lang="en-US" sz="2000" dirty="0"/>
+              <a:t>Support Vector Machine Model</a:t>
             </a:r>
           </a:p>
           <a:p>
             <a:pPr lvl="1"/>
             <a:r>
-              <a:rPr lang="en-US" dirty="0"/>
-              <a:t>Calculate distance</a:t>
+              <a:rPr lang="en-US" sz="1700" dirty="0"/>
+              <a:t>Find hyperplane in N-dimensional space</a:t>
+            </a:r>
+          </a:p>
+          <a:p>
+            <a:pPr lvl="3"/>
+            <a:r>
+              <a:rPr lang="en-US" sz="1500" dirty="0"/>
+              <a:t>N = number of features</a:t>
+            </a:r>
+          </a:p>
+          <a:p>
+            <a:pPr lvl="3"/>
+            <a:r>
+              <a:rPr lang="en-US" sz="1500" dirty="0"/>
+              <a:t>Hyperplane  = decision boundary that classifies data point</a:t>
             </a:r>
           </a:p>
           <a:p>
             <a:pPr lvl="1"/>
             <a:r>
-              <a:rPr lang="en-US" dirty="0"/>
-              <a:t>Find nearest neighbors</a:t>
+              <a:rPr lang="en-US" sz="1700" dirty="0"/>
+              <a:t>Support vector</a:t>
+            </a:r>
+          </a:p>
+          <a:p>
+            <a:pPr lvl="3"/>
+            <a:r>
+              <a:rPr lang="en-US" sz="1500" dirty="0"/>
+              <a:t>Data point closer to the hyperplane</a:t>
             </a:r>
           </a:p>
           <a:p>
             <a:pPr lvl="1"/>
             <a:r>
-              <a:rPr lang="en-US" dirty="0"/>
-              <a:t>Vote on label</a:t>
+              <a:rPr lang="en-US" sz="1700" dirty="0"/>
+              <a:t>Overfitting</a:t>
             </a:r>
           </a:p>
           <a:p>
             <a:pPr lvl="1"/>
-            <a:r>
-              <a:rPr lang="en-US" dirty="0"/>
-              <a:t>K = 7 optimal</a:t>
-            </a:r>
+            <a:endParaRPr lang="en-US" dirty="0"/>
           </a:p>
           <a:p>
             <a:pPr lvl="1"/>
@@ -6641,10 +6526,10 @@
       </p:sp>
       <p:pic>
         <p:nvPicPr>
-          <p:cNvPr id="8" name="Picture 7">
+          <p:cNvPr id="5" name="Picture 4">
             <a:extLst>
               <a:ext uri="{FF2B5EF4-FFF2-40B4-BE49-F238E27FC236}">
-                <a16:creationId xmlns:a16="http://schemas.microsoft.com/office/drawing/2014/main" id="{66F47B94-057A-412D-9803-F8BDBEEEDE41}"/>
+                <a16:creationId xmlns:a16="http://schemas.microsoft.com/office/drawing/2014/main" id="{851E11F2-3515-40A4-A1B5-C9120CC1E87C}"/>
               </a:ext>
             </a:extLst>
           </p:cNvPr>
@@ -6661,8 +6546,8 @@
         </p:blipFill>
         <p:spPr>
           <a:xfrm>
-            <a:off x="6096000" y="2587458"/>
-            <a:ext cx="5937504" cy="3664288"/>
+            <a:off x="7290098" y="2385732"/>
+            <a:ext cx="4527624" cy="3234017"/>
           </a:xfrm>
           <a:prstGeom prst="rect">
             <a:avLst/>
@@ -6672,7 +6557,7 @@
     </p:spTree>
     <p:extLst>
       <p:ext uri="{BB962C8B-B14F-4D97-AF65-F5344CB8AC3E}">
-        <p14:creationId xmlns:p14="http://schemas.microsoft.com/office/powerpoint/2010/main" val="133443932"/>
+        <p14:creationId xmlns:p14="http://schemas.microsoft.com/office/powerpoint/2010/main" val="1095122572"/>
       </p:ext>
     </p:extLst>
   </p:cSld>
@@ -6762,34 +6647,44 @@
           <a:lstStyle/>
           <a:p>
             <a:r>
-              <a:rPr lang="en-US" dirty="0"/>
-              <a:t>Random Forest</a:t>
+              <a:rPr lang="en-US" sz="2000" dirty="0"/>
+              <a:t>KNN</a:t>
             </a:r>
           </a:p>
           <a:p>
             <a:pPr lvl="1"/>
             <a:r>
-              <a:rPr lang="en-US" dirty="0"/>
-              <a:t>22 Selected Predictor</a:t>
+              <a:rPr lang="en-US" sz="1700" dirty="0"/>
+              <a:t>Calculate distance</a:t>
             </a:r>
           </a:p>
           <a:p>
             <a:pPr lvl="1"/>
             <a:r>
-              <a:rPr lang="en-US" dirty="0"/>
-              <a:t>Repeated CV</a:t>
+              <a:rPr lang="en-US" sz="1700" dirty="0"/>
+              <a:t>Find nearest neighbors</a:t>
             </a:r>
           </a:p>
           <a:p>
             <a:pPr lvl="1"/>
             <a:r>
-              <a:rPr lang="en-US" dirty="0"/>
-              <a:t>$1050 RMSE</a:t>
+              <a:rPr lang="en-US" sz="1700" dirty="0"/>
+              <a:t>Vote on label</a:t>
             </a:r>
           </a:p>
           <a:p>
             <a:pPr lvl="1"/>
-            <a:endParaRPr lang="en-US" dirty="0"/>
+            <a:r>
+              <a:rPr lang="en-US" sz="1700" dirty="0"/>
+              <a:t>K = 5 optimal</a:t>
+            </a:r>
+          </a:p>
+          <a:p>
+            <a:pPr lvl="1"/>
+            <a:r>
+              <a:rPr lang="en-US" sz="1700" dirty="0"/>
+              <a:t>$2025 RMSE</a:t>
+            </a:r>
           </a:p>
           <a:p>
             <a:pPr lvl="1"/>
@@ -6799,10 +6694,10 @@
       </p:sp>
       <p:pic>
         <p:nvPicPr>
-          <p:cNvPr id="7" name="Picture 6">
+          <p:cNvPr id="4" name="Picture 3">
             <a:extLst>
               <a:ext uri="{FF2B5EF4-FFF2-40B4-BE49-F238E27FC236}">
-                <a16:creationId xmlns:a16="http://schemas.microsoft.com/office/drawing/2014/main" id="{0857ED44-DBEB-4F8D-A60F-932D3F4CED8B}"/>
+                <a16:creationId xmlns:a16="http://schemas.microsoft.com/office/drawing/2014/main" id="{0CFD3AD1-EF59-496C-A14B-CE19251A2295}"/>
               </a:ext>
             </a:extLst>
           </p:cNvPr>
@@ -6819,8 +6714,8 @@
         </p:blipFill>
         <p:spPr>
           <a:xfrm>
-            <a:off x="6260464" y="2555791"/>
-            <a:ext cx="5242560" cy="3235409"/>
+            <a:off x="6096000" y="2345377"/>
+            <a:ext cx="4800600" cy="3598223"/>
           </a:xfrm>
           <a:prstGeom prst="rect">
             <a:avLst/>
@@ -6830,7 +6725,7 @@
     </p:spTree>
     <p:extLst>
       <p:ext uri="{BB962C8B-B14F-4D97-AF65-F5344CB8AC3E}">
-        <p14:creationId xmlns:p14="http://schemas.microsoft.com/office/powerpoint/2010/main" val="1712172828"/>
+        <p14:creationId xmlns:p14="http://schemas.microsoft.com/office/powerpoint/2010/main" val="133443932"/>
       </p:ext>
     </p:extLst>
   </p:cSld>
@@ -6911,7 +6806,7 @@
         </p:nvSpPr>
         <p:spPr>
           <a:xfrm>
-            <a:off x="2173288" y="2667000"/>
+            <a:off x="2173288" y="2628898"/>
             <a:ext cx="10018712" cy="3124200"/>
           </a:xfrm>
         </p:spPr>
@@ -6920,23 +6815,34 @@
           <a:lstStyle/>
           <a:p>
             <a:r>
-              <a:rPr lang="en-US" dirty="0"/>
-              <a:t>SVN Model</a:t>
+              <a:rPr lang="en-US" sz="2000" dirty="0"/>
+              <a:t>Random Forest</a:t>
             </a:r>
           </a:p>
           <a:p>
             <a:pPr lvl="1"/>
             <a:r>
-              <a:rPr lang="en-US" dirty="0"/>
-              <a:t>Cost plateaued </a:t>
+              <a:rPr lang="en-US" sz="1700" dirty="0"/>
+              <a:t>22 Selected Predictor</a:t>
             </a:r>
           </a:p>
           <a:p>
             <a:pPr lvl="1"/>
             <a:r>
-              <a:rPr lang="en-US" dirty="0"/>
-              <a:t>RMSE - $1300</a:t>
-            </a:r>
+              <a:rPr lang="en-US" sz="1700" dirty="0"/>
+              <a:t>Repeated CV</a:t>
+            </a:r>
+          </a:p>
+          <a:p>
+            <a:pPr lvl="1"/>
+            <a:r>
+              <a:rPr lang="en-US" sz="1700" dirty="0"/>
+              <a:t>$1050 RMSE</a:t>
+            </a:r>
+          </a:p>
+          <a:p>
+            <a:pPr lvl="1"/>
+            <a:endParaRPr lang="en-US" dirty="0"/>
           </a:p>
           <a:p>
             <a:pPr lvl="1"/>
@@ -6949,7 +6855,7 @@
           <p:cNvPr id="5" name="Picture 4">
             <a:extLst>
               <a:ext uri="{FF2B5EF4-FFF2-40B4-BE49-F238E27FC236}">
-                <a16:creationId xmlns:a16="http://schemas.microsoft.com/office/drawing/2014/main" id="{DA18CB13-645B-4390-9ECD-20F14CCBA340}"/>
+                <a16:creationId xmlns:a16="http://schemas.microsoft.com/office/drawing/2014/main" id="{7E8CDDC8-3B0C-4DEA-A8BC-DECEDAE05729}"/>
               </a:ext>
             </a:extLst>
           </p:cNvPr>
@@ -6966,8 +6872,8 @@
         </p:blipFill>
         <p:spPr>
           <a:xfrm>
-            <a:off x="5508047" y="2667000"/>
-            <a:ext cx="5994977" cy="3699757"/>
+            <a:off x="6096000" y="2438399"/>
+            <a:ext cx="5002975" cy="3573553"/>
           </a:xfrm>
           <a:prstGeom prst="rect">
             <a:avLst/>
@@ -6977,7 +6883,7 @@
     </p:spTree>
     <p:extLst>
       <p:ext uri="{BB962C8B-B14F-4D97-AF65-F5344CB8AC3E}">
-        <p14:creationId xmlns:p14="http://schemas.microsoft.com/office/powerpoint/2010/main" val="378675624"/>
+        <p14:creationId xmlns:p14="http://schemas.microsoft.com/office/powerpoint/2010/main" val="1712172828"/>
       </p:ext>
     </p:extLst>
   </p:cSld>
@@ -7035,7 +6941,7 @@
           <a:p>
             <a:r>
               <a:rPr lang="en-US" dirty="0"/>
-              <a:t>Best Models</a:t>
+              <a:t>Salary Model</a:t>
             </a:r>
           </a:p>
         </p:txBody>
@@ -7063,85 +6969,68 @@
           </a:xfrm>
         </p:spPr>
         <p:txBody>
-          <a:bodyPr>
-            <a:normAutofit fontScale="85000" lnSpcReduction="20000"/>
-          </a:bodyPr>
-          <a:lstStyle/>
-          <a:p>
-            <a:r>
-              <a:rPr lang="en-US" dirty="0"/>
-              <a:t>Attrition</a:t>
+          <a:bodyPr/>
+          <a:lstStyle/>
+          <a:p>
+            <a:r>
+              <a:rPr lang="en-US" sz="2000" dirty="0"/>
+              <a:t>SVN Model</a:t>
             </a:r>
           </a:p>
           <a:p>
             <a:pPr lvl="1"/>
             <a:r>
-              <a:rPr lang="en-US" dirty="0"/>
-              <a:t>Random Forest Model</a:t>
-            </a:r>
-          </a:p>
-          <a:p>
-            <a:pPr lvl="2"/>
-            <a:r>
-              <a:rPr lang="en-US" dirty="0"/>
-              <a:t>Accuracy = 86.97%</a:t>
-            </a:r>
-          </a:p>
-          <a:p>
-            <a:pPr lvl="2"/>
-            <a:r>
-              <a:rPr lang="en-US" dirty="0"/>
-              <a:t>Specificity = 87.65</a:t>
-            </a:r>
-          </a:p>
-          <a:p>
-            <a:pPr lvl="2"/>
-            <a:r>
-              <a:rPr lang="en-US" dirty="0"/>
-              <a:t>Sensitivity = 70%</a:t>
-            </a:r>
-          </a:p>
-          <a:p>
-            <a:r>
-              <a:rPr lang="en-US" dirty="0"/>
-              <a:t>Salary</a:t>
+              <a:rPr lang="en-US" sz="1700" dirty="0"/>
+              <a:t>Cost plateaued </a:t>
             </a:r>
           </a:p>
           <a:p>
             <a:pPr lvl="1"/>
             <a:r>
-              <a:rPr lang="en-US" dirty="0"/>
-              <a:t>Random Forest Model</a:t>
-            </a:r>
-          </a:p>
-          <a:p>
-            <a:pPr lvl="2"/>
-            <a:r>
-              <a:rPr lang="en-US" dirty="0"/>
-              <a:t>22 selected</a:t>
-            </a:r>
-          </a:p>
-          <a:p>
-            <a:pPr lvl="2"/>
-            <a:r>
-              <a:rPr lang="en-US" dirty="0"/>
-              <a:t>$1050 RMSE</a:t>
-            </a:r>
-          </a:p>
-          <a:p>
-            <a:pPr lvl="2"/>
-            <a:endParaRPr lang="en-US" dirty="0"/>
-          </a:p>
-          <a:p>
-            <a:pPr lvl="2"/>
-            <a:endParaRPr lang="en-US" dirty="0"/>
-          </a:p>
-        </p:txBody>
-      </p:sp>
+              <a:rPr lang="en-US" sz="1700" dirty="0"/>
+              <a:t>RMSE - $1300</a:t>
+            </a:r>
+          </a:p>
+          <a:p>
+            <a:pPr lvl="1"/>
+            <a:endParaRPr lang="en-US" dirty="0"/>
+          </a:p>
+        </p:txBody>
+      </p:sp>
+      <p:pic>
+        <p:nvPicPr>
+          <p:cNvPr id="6" name="Picture 5">
+            <a:extLst>
+              <a:ext uri="{FF2B5EF4-FFF2-40B4-BE49-F238E27FC236}">
+                <a16:creationId xmlns:a16="http://schemas.microsoft.com/office/drawing/2014/main" id="{36FEB8DB-0CD1-495A-95AC-7AB48DB01004}"/>
+              </a:ext>
+            </a:extLst>
+          </p:cNvPr>
+          <p:cNvPicPr>
+            <a:picLocks noChangeAspect="1"/>
+          </p:cNvPicPr>
+          <p:nvPr/>
+        </p:nvPicPr>
+        <p:blipFill>
+          <a:blip r:embed="rId2"/>
+          <a:stretch>
+            <a:fillRect/>
+          </a:stretch>
+        </p:blipFill>
+        <p:spPr>
+          <a:xfrm>
+            <a:off x="5888379" y="2542309"/>
+            <a:ext cx="4907280" cy="3505200"/>
+          </a:xfrm>
+          <a:prstGeom prst="rect">
+            <a:avLst/>
+          </a:prstGeom>
+        </p:spPr>
+      </p:pic>
     </p:spTree>
     <p:extLst>
       <p:ext uri="{BB962C8B-B14F-4D97-AF65-F5344CB8AC3E}">
-        <p14:creationId xmlns:p14="http://schemas.microsoft.com/office/powerpoint/2010/main" val="1864483583"/>
+        <p14:creationId xmlns:p14="http://schemas.microsoft.com/office/powerpoint/2010/main" val="378675624"/>
       </p:ext>
     </p:extLst>
   </p:cSld>
@@ -7222,59 +7111,52 @@
         </p:nvSpPr>
         <p:spPr>
           <a:xfrm>
-            <a:off x="2173288" y="2667000"/>
+            <a:off x="2173288" y="3048000"/>
             <a:ext cx="10018712" cy="3124200"/>
           </a:xfrm>
         </p:spPr>
         <p:txBody>
           <a:bodyPr>
-            <a:normAutofit lnSpcReduction="10000"/>
+            <a:normAutofit/>
           </a:bodyPr>
           <a:lstStyle/>
           <a:p>
             <a:r>
-              <a:rPr lang="en-US" dirty="0"/>
-              <a:t>Random Forest Model for both predictor and classifiers</a:t>
+              <a:rPr lang="en-US" sz="2000" dirty="0"/>
+              <a:t>Random Forest Model best for both model predictor and classifiers</a:t>
             </a:r>
           </a:p>
           <a:p>
             <a:pPr lvl="1"/>
             <a:r>
-              <a:rPr lang="en-US" dirty="0"/>
+              <a:rPr lang="en-US" sz="1700" dirty="0"/>
               <a:t>Based on trees so scaling variables doesn’t matter</a:t>
             </a:r>
           </a:p>
           <a:p>
             <a:pPr lvl="1"/>
             <a:r>
-              <a:rPr lang="en-US" dirty="0"/>
-              <a:t>Random subspace and bagging to prevent overfitting</a:t>
+              <a:rPr lang="en-US" sz="1700" dirty="0"/>
+              <a:t>Deals with missing data not needed here</a:t>
             </a:r>
           </a:p>
           <a:p>
             <a:pPr lvl="1"/>
             <a:r>
-              <a:rPr lang="en-US" dirty="0"/>
-              <a:t>Deals with missing data not needed here</a:t>
+              <a:rPr lang="en-US" sz="1700" dirty="0"/>
+              <a:t>Automated feature selection built in</a:t>
+            </a:r>
+          </a:p>
+          <a:p>
+            <a:r>
+              <a:rPr lang="en-US" sz="2000" dirty="0"/>
+              <a:t>Other than Stock Options, Monthly Income, and Overtime</a:t>
             </a:r>
           </a:p>
           <a:p>
             <a:pPr lvl="1"/>
             <a:r>
-              <a:rPr lang="en-US" dirty="0"/>
-              <a:t>Automated feature selection built in</a:t>
-            </a:r>
-          </a:p>
-          <a:p>
-            <a:r>
-              <a:rPr lang="en-US" dirty="0"/>
-              <a:t>Other than Stock Options, Monthly Income, and Overtime</a:t>
-            </a:r>
-          </a:p>
-          <a:p>
-            <a:pPr lvl="1"/>
-            <a:r>
-              <a:rPr lang="en-US" dirty="0"/>
+              <a:rPr lang="en-US" sz="1700" dirty="0"/>
               <a:t>Age, Total Working Years and Marital Status strong factors for attrition</a:t>
             </a:r>
           </a:p>
@@ -7352,7 +7234,7 @@
           <a:p>
             <a:r>
               <a:rPr lang="en-US" dirty="0"/>
-              <a:t>Agenda</a:t>
+              <a:t>Executive Summary</a:t>
             </a:r>
           </a:p>
         </p:txBody>
@@ -7383,50 +7265,24 @@
           <a:bodyPr/>
           <a:lstStyle/>
           <a:p>
+            <a:pPr marL="0" indent="0">
+              <a:buNone/>
+            </a:pPr>
+            <a:r>
+              <a:rPr lang="en-US" dirty="0" err="1"/>
+              <a:t>DDSAnalytics</a:t>
+            </a:r>
             <a:r>
               <a:rPr lang="en-US" dirty="0"/>
-              <a:t>Summary Statistics</a:t>
-            </a:r>
-          </a:p>
-          <a:p>
-            <a:r>
-              <a:rPr lang="en-US" dirty="0"/>
-              <a:t>Attrition Factors</a:t>
-            </a:r>
-          </a:p>
-          <a:p>
-            <a:r>
-              <a:rPr lang="en-US" dirty="0"/>
-              <a:t>Trends in Data</a:t>
-            </a:r>
-          </a:p>
-          <a:p>
-            <a:r>
-              <a:rPr lang="en-US" dirty="0"/>
-              <a:t>Classification Model</a:t>
-            </a:r>
-          </a:p>
-          <a:p>
-            <a:r>
-              <a:rPr lang="en-US" dirty="0"/>
-              <a:t>Regression Model</a:t>
-            </a:r>
-          </a:p>
-          <a:p>
-            <a:r>
-              <a:rPr lang="en-US" dirty="0"/>
-              <a:t>Conclusion</a:t>
-            </a:r>
-          </a:p>
-          <a:p>
-            <a:endParaRPr lang="en-US" dirty="0"/>
+              <a:t> is an analytics firm specializing in talent management solutions for Fortune 100 companies. Leveraging data science, they want to investigate employee turnover for additional value to their clients.  </a:t>
+            </a:r>
           </a:p>
         </p:txBody>
       </p:sp>
     </p:spTree>
     <p:extLst>
       <p:ext uri="{BB962C8B-B14F-4D97-AF65-F5344CB8AC3E}">
-        <p14:creationId xmlns:p14="http://schemas.microsoft.com/office/powerpoint/2010/main" val="2777130632"/>
+        <p14:creationId xmlns:p14="http://schemas.microsoft.com/office/powerpoint/2010/main" val="3842018742"/>
       </p:ext>
     </p:extLst>
   </p:cSld>
@@ -7484,7 +7340,7 @@
           <a:p>
             <a:r>
               <a:rPr lang="en-US" dirty="0"/>
-              <a:t>Summary Statistics</a:t>
+              <a:t>Agenda</a:t>
             </a:r>
           </a:p>
         </p:txBody>
@@ -7512,72 +7368,61 @@
           </a:xfrm>
         </p:spPr>
         <p:txBody>
-          <a:bodyPr/>
+          <a:bodyPr>
+            <a:normAutofit fontScale="92500" lnSpcReduction="20000"/>
+          </a:bodyPr>
           <a:lstStyle/>
           <a:p>
             <a:r>
               <a:rPr lang="en-US" dirty="0"/>
-              <a:t>870 Observations with 36 variables</a:t>
+              <a:t>Summary Statistics</a:t>
             </a:r>
           </a:p>
           <a:p>
             <a:r>
               <a:rPr lang="en-US" dirty="0"/>
-              <a:t>No missing data</a:t>
+              <a:t>Attrition Factors</a:t>
             </a:r>
           </a:p>
           <a:p>
             <a:r>
               <a:rPr lang="en-US" dirty="0"/>
-              <a:t>Average values for variables </a:t>
-            </a:r>
-            <a:r>
-              <a:rPr lang="en-US" dirty="0">
-                <a:sym typeface="Wingdings" panose="05000000000000000000" pitchFamily="2" charset="2"/>
-              </a:rPr>
-              <a:t></a:t>
-            </a:r>
-            <a:endParaRPr lang="en-US" dirty="0"/>
-          </a:p>
-          <a:p>
-            <a:endParaRPr lang="en-US" dirty="0"/>
-          </a:p>
-        </p:txBody>
-      </p:sp>
-      <p:pic>
-        <p:nvPicPr>
-          <p:cNvPr id="5" name="Picture 4">
-            <a:extLst>
-              <a:ext uri="{FF2B5EF4-FFF2-40B4-BE49-F238E27FC236}">
-                <a16:creationId xmlns:a16="http://schemas.microsoft.com/office/drawing/2014/main" id="{F65B8DEF-523F-4E2A-8002-B6F758074E5B}"/>
-              </a:ext>
-            </a:extLst>
-          </p:cNvPr>
-          <p:cNvPicPr>
-            <a:picLocks noChangeAspect="1"/>
-          </p:cNvPicPr>
-          <p:nvPr/>
-        </p:nvPicPr>
-        <p:blipFill>
-          <a:blip r:embed="rId2"/>
-          <a:stretch>
-            <a:fillRect/>
-          </a:stretch>
-        </p:blipFill>
-        <p:spPr>
-          <a:xfrm>
-            <a:off x="6547638" y="3629176"/>
-            <a:ext cx="2435106" cy="2295514"/>
-          </a:xfrm>
-          <a:prstGeom prst="rect">
-            <a:avLst/>
-          </a:prstGeom>
-        </p:spPr>
-      </p:pic>
+              <a:t>Correlation in Data</a:t>
+            </a:r>
+          </a:p>
+          <a:p>
+            <a:r>
+              <a:rPr lang="en-US" dirty="0"/>
+              <a:t>Trends in Data</a:t>
+            </a:r>
+          </a:p>
+          <a:p>
+            <a:r>
+              <a:rPr lang="en-US" dirty="0"/>
+              <a:t>Classification Model for Attrition</a:t>
+            </a:r>
+          </a:p>
+          <a:p>
+            <a:r>
+              <a:rPr lang="en-US" dirty="0"/>
+              <a:t>Regression Model for Monthly Salary</a:t>
+            </a:r>
+          </a:p>
+          <a:p>
+            <a:r>
+              <a:rPr lang="en-US" dirty="0"/>
+              <a:t>Conclusion</a:t>
+            </a:r>
+          </a:p>
+          <a:p>
+            <a:endParaRPr lang="en-US" dirty="0"/>
+          </a:p>
+        </p:txBody>
+      </p:sp>
     </p:spTree>
     <p:extLst>
       <p:ext uri="{BB962C8B-B14F-4D97-AF65-F5344CB8AC3E}">
-        <p14:creationId xmlns:p14="http://schemas.microsoft.com/office/powerpoint/2010/main" val="1959421960"/>
+        <p14:creationId xmlns:p14="http://schemas.microsoft.com/office/powerpoint/2010/main" val="2777130632"/>
       </p:ext>
     </p:extLst>
   </p:cSld>
@@ -7635,7 +7480,7 @@
           <a:p>
             <a:r>
               <a:rPr lang="en-US" dirty="0"/>
-              <a:t>Attrition Factors</a:t>
+              <a:t>Summary Statistics</a:t>
             </a:r>
           </a:p>
         </p:txBody>
@@ -7663,47 +7508,67 @@
           </a:xfrm>
         </p:spPr>
         <p:txBody>
-          <a:bodyPr/>
-          <a:lstStyle/>
-          <a:p>
-            <a:r>
-              <a:rPr lang="en-US" dirty="0"/>
-              <a:t>Top 3 factors :</a:t>
+          <a:bodyPr>
+            <a:normAutofit/>
+          </a:bodyPr>
+          <a:lstStyle/>
+          <a:p>
+            <a:r>
+              <a:rPr lang="en-US" sz="2000" dirty="0"/>
+              <a:t>870 Observations with 36 variables</a:t>
+            </a:r>
+          </a:p>
+          <a:p>
+            <a:r>
+              <a:rPr lang="en-US" sz="2000" dirty="0"/>
+              <a:t>No missing data</a:t>
+            </a:r>
+          </a:p>
+          <a:p>
+            <a:r>
+              <a:rPr lang="en-US" sz="2000" dirty="0"/>
+              <a:t>Data compromised of</a:t>
             </a:r>
           </a:p>
           <a:p>
             <a:pPr lvl="1"/>
             <a:r>
-              <a:rPr lang="en-US" dirty="0"/>
-              <a:t>Overtime</a:t>
+              <a:rPr lang="en-US" sz="1700" dirty="0"/>
+              <a:t>Employee Measurements</a:t>
             </a:r>
           </a:p>
           <a:p>
             <a:pPr lvl="1"/>
             <a:r>
-              <a:rPr lang="en-US" dirty="0"/>
-              <a:t>Monthly Income</a:t>
+              <a:rPr lang="en-US" sz="1700" dirty="0"/>
+              <a:t>Employer Measurements</a:t>
             </a:r>
           </a:p>
           <a:p>
             <a:pPr lvl="1"/>
             <a:r>
-              <a:rPr lang="en-US" dirty="0"/>
-              <a:t>Stock Option Level</a:t>
+              <a:rPr lang="en-US" sz="1700" dirty="0"/>
+              <a:t>Work Life Balance </a:t>
             </a:r>
           </a:p>
           <a:p>
             <a:pPr lvl="1"/>
+            <a:r>
+              <a:rPr lang="en-US" sz="1700" dirty="0"/>
+              <a:t>Income Based</a:t>
+            </a:r>
+          </a:p>
+          <a:p>
             <a:endParaRPr lang="en-US" dirty="0"/>
           </a:p>
         </p:txBody>
       </p:sp>
       <p:pic>
         <p:nvPicPr>
-          <p:cNvPr id="4" name="Picture 3">
+          <p:cNvPr id="5" name="Picture 4">
             <a:extLst>
               <a:ext uri="{FF2B5EF4-FFF2-40B4-BE49-F238E27FC236}">
-                <a16:creationId xmlns:a16="http://schemas.microsoft.com/office/drawing/2014/main" id="{5E0CEF43-E7BF-4937-99BF-74ACC7F1EA67}"/>
+                <a16:creationId xmlns:a16="http://schemas.microsoft.com/office/drawing/2014/main" id="{F65B8DEF-523F-4E2A-8002-B6F758074E5B}"/>
               </a:ext>
             </a:extLst>
           </p:cNvPr>
@@ -7720,18 +7585,53 @@
         </p:blipFill>
         <p:spPr>
           <a:xfrm>
-            <a:off x="5801445" y="1901376"/>
-            <a:ext cx="5979154" cy="4270824"/>
+            <a:off x="7394713" y="2825890"/>
+            <a:ext cx="3511826" cy="2748349"/>
           </a:xfrm>
           <a:prstGeom prst="rect">
             <a:avLst/>
           </a:prstGeom>
         </p:spPr>
       </p:pic>
+      <p:sp>
+        <p:nvSpPr>
+          <p:cNvPr id="4" name="TextBox 3">
+            <a:extLst>
+              <a:ext uri="{FF2B5EF4-FFF2-40B4-BE49-F238E27FC236}">
+                <a16:creationId xmlns:a16="http://schemas.microsoft.com/office/drawing/2014/main" id="{65A506CB-AEF1-46F7-B7BF-C6A7374F01ED}"/>
+              </a:ext>
+            </a:extLst>
+          </p:cNvPr>
+          <p:cNvSpPr txBox="1"/>
+          <p:nvPr/>
+        </p:nvSpPr>
+        <p:spPr>
+          <a:xfrm>
+            <a:off x="7379611" y="2412623"/>
+            <a:ext cx="3526928" cy="369332"/>
+          </a:xfrm>
+          <a:prstGeom prst="rect">
+            <a:avLst/>
+          </a:prstGeom>
+          <a:noFill/>
+        </p:spPr>
+        <p:txBody>
+          <a:bodyPr wrap="none" rtlCol="0">
+            <a:spAutoFit/>
+          </a:bodyPr>
+          <a:lstStyle/>
+          <a:p>
+            <a:r>
+              <a:rPr lang="en-US" u="sng" dirty="0"/>
+              <a:t>Mean values for  selected variables </a:t>
+            </a:r>
+          </a:p>
+        </p:txBody>
+      </p:sp>
     </p:spTree>
     <p:extLst>
       <p:ext uri="{BB962C8B-B14F-4D97-AF65-F5344CB8AC3E}">
-        <p14:creationId xmlns:p14="http://schemas.microsoft.com/office/powerpoint/2010/main" val="1021531325"/>
+        <p14:creationId xmlns:p14="http://schemas.microsoft.com/office/powerpoint/2010/main" val="1959421960"/>
       </p:ext>
     </p:extLst>
   </p:cSld>
@@ -7789,7 +7689,7 @@
           <a:p>
             <a:r>
               <a:rPr lang="en-US" dirty="0"/>
-              <a:t>Interesting Trends in Data</a:t>
+              <a:t>Attrition Factors</a:t>
             </a:r>
           </a:p>
         </p:txBody>
@@ -7812,43 +7712,74 @@
         </p:nvSpPr>
         <p:spPr>
           <a:xfrm>
-            <a:off x="2173288" y="2667000"/>
+            <a:off x="1722714" y="2600739"/>
             <a:ext cx="10018712" cy="3124200"/>
           </a:xfrm>
         </p:spPr>
         <p:txBody>
-          <a:bodyPr/>
+          <a:bodyPr>
+            <a:normAutofit fontScale="85000" lnSpcReduction="20000"/>
+          </a:bodyPr>
           <a:lstStyle/>
           <a:p>
             <a:r>
               <a:rPr lang="en-US" dirty="0"/>
-              <a:t>Job Satisfaction by Title</a:t>
+              <a:t>Boruta Feature Selection</a:t>
             </a:r>
           </a:p>
           <a:p>
             <a:pPr lvl="1"/>
             <a:r>
               <a:rPr lang="en-US" dirty="0"/>
-              <a:t>HR </a:t>
-            </a:r>
-            <a:r>
-              <a:rPr lang="en-US" dirty="0" err="1"/>
-              <a:t>Represenative</a:t>
-            </a:r>
-            <a:endParaRPr lang="en-US" dirty="0"/>
+              <a:t>Captures important features</a:t>
+            </a:r>
           </a:p>
           <a:p>
             <a:pPr lvl="1"/>
             <a:r>
               <a:rPr lang="en-US" dirty="0"/>
-              <a:t>Years with company</a:t>
+              <a:t>Duplicates the dataset, shuffles values</a:t>
             </a:r>
           </a:p>
           <a:p>
             <a:pPr lvl="1"/>
             <a:r>
               <a:rPr lang="en-US" dirty="0"/>
-              <a:t>XYZ</a:t>
+              <a:t>Iterates and checks z scores</a:t>
+            </a:r>
+          </a:p>
+          <a:p>
+            <a:pPr lvl="2"/>
+            <a:r>
+              <a:rPr lang="en-US" dirty="0"/>
+              <a:t>Z score is standard deviations from mean</a:t>
+            </a:r>
+          </a:p>
+          <a:p>
+            <a:r>
+              <a:rPr lang="en-US" dirty="0"/>
+              <a:t>Top 3 factors :</a:t>
+            </a:r>
+          </a:p>
+          <a:p>
+            <a:pPr lvl="1"/>
+            <a:r>
+              <a:rPr lang="en-US" dirty="0"/>
+              <a:t>Overtime</a:t>
+            </a:r>
+          </a:p>
+          <a:p>
+            <a:pPr lvl="1"/>
+            <a:r>
+              <a:rPr lang="en-US" dirty="0"/>
+              <a:t>Monthly Income</a:t>
+            </a:r>
+          </a:p>
+          <a:p>
+            <a:pPr lvl="1"/>
+            <a:r>
+              <a:rPr lang="en-US" dirty="0"/>
+              <a:t>Stock Option Level</a:t>
             </a:r>
           </a:p>
           <a:p>
@@ -7859,10 +7790,10 @@
       </p:sp>
       <p:pic>
         <p:nvPicPr>
-          <p:cNvPr id="5" name="Picture 4">
+          <p:cNvPr id="4" name="Picture 3">
             <a:extLst>
               <a:ext uri="{FF2B5EF4-FFF2-40B4-BE49-F238E27FC236}">
-                <a16:creationId xmlns:a16="http://schemas.microsoft.com/office/drawing/2014/main" id="{BC5C52FC-4FB7-49F4-8798-42949F7BE297}"/>
+                <a16:creationId xmlns:a16="http://schemas.microsoft.com/office/drawing/2014/main" id="{5E0CEF43-E7BF-4937-99BF-74ACC7F1EA67}"/>
               </a:ext>
             </a:extLst>
           </p:cNvPr>
@@ -7879,8 +7810,8 @@
         </p:blipFill>
         <p:spPr>
           <a:xfrm>
-            <a:off x="5688746" y="2733858"/>
-            <a:ext cx="5691334" cy="3512366"/>
+            <a:off x="6308035" y="2024619"/>
+            <a:ext cx="5433391" cy="4147581"/>
           </a:xfrm>
           <a:prstGeom prst="rect">
             <a:avLst/>
@@ -7890,7 +7821,7 @@
     </p:spTree>
     <p:extLst>
       <p:ext uri="{BB962C8B-B14F-4D97-AF65-F5344CB8AC3E}">
-        <p14:creationId xmlns:p14="http://schemas.microsoft.com/office/powerpoint/2010/main" val="1951416057"/>
+        <p14:creationId xmlns:p14="http://schemas.microsoft.com/office/powerpoint/2010/main" val="1021531325"/>
       </p:ext>
     </p:extLst>
   </p:cSld>
@@ -7948,7 +7879,7 @@
           <a:p>
             <a:r>
               <a:rPr lang="en-US" dirty="0"/>
-              <a:t>Interesting Trends in Data</a:t>
+              <a:t>Correlation</a:t>
             </a:r>
           </a:p>
         </p:txBody>
@@ -7971,52 +7902,117 @@
         </p:nvSpPr>
         <p:spPr>
           <a:xfrm>
-            <a:off x="2173288" y="2667000"/>
+            <a:off x="1366454" y="2481986"/>
             <a:ext cx="10018712" cy="3124200"/>
           </a:xfrm>
         </p:spPr>
         <p:txBody>
-          <a:bodyPr/>
-          <a:lstStyle/>
-          <a:p>
-            <a:r>
-              <a:rPr lang="en-US" dirty="0"/>
-              <a:t>Median Monthly Salary by Title</a:t>
+          <a:bodyPr>
+            <a:normAutofit/>
+          </a:bodyPr>
+          <a:lstStyle/>
+          <a:p>
+            <a:r>
+              <a:rPr lang="en-US" sz="2000" dirty="0"/>
+              <a:t>Dropped variables with high correlation between each other</a:t>
             </a:r>
           </a:p>
           <a:p>
             <a:pPr lvl="1"/>
             <a:r>
-              <a:rPr lang="en-US" dirty="0"/>
-              <a:t>Manager </a:t>
+              <a:rPr lang="en-US" sz="1700" dirty="0" err="1"/>
+              <a:t>YearsAtCompany</a:t>
+            </a:r>
+            <a:r>
+              <a:rPr lang="en-US" sz="1700" dirty="0"/>
+              <a:t>, </a:t>
+            </a:r>
+            <a:r>
+              <a:rPr lang="en-US" sz="1700" dirty="0" err="1"/>
+              <a:t>TotalWorkingYears</a:t>
+            </a:r>
+            <a:r>
+              <a:rPr lang="en-US" sz="1700" dirty="0"/>
+              <a:t>, </a:t>
+            </a:r>
+            <a:r>
+              <a:rPr lang="en-US" sz="1700" dirty="0" err="1"/>
+              <a:t>JobLevel</a:t>
+            </a:r>
+            <a:r>
+              <a:rPr lang="en-US" sz="1700" dirty="0"/>
+              <a:t>, </a:t>
+            </a:r>
+            <a:r>
+              <a:rPr lang="en-US" sz="1700" dirty="0" err="1"/>
+              <a:t>PercentSalaryHike</a:t>
+            </a:r>
+            <a:endParaRPr lang="en-US" sz="1700" dirty="0"/>
+          </a:p>
+          <a:p>
+            <a:r>
+              <a:rPr lang="en-US" sz="2000" dirty="0"/>
+              <a:t>Dropped variables with 0 variance</a:t>
             </a:r>
           </a:p>
           <a:p>
             <a:pPr lvl="1"/>
             <a:r>
-              <a:rPr lang="en-US" dirty="0"/>
-              <a:t>Research Director</a:t>
+              <a:rPr lang="en-US" sz="1700" dirty="0"/>
+              <a:t>Over18, </a:t>
+            </a:r>
+            <a:r>
+              <a:rPr lang="en-US" sz="1700" dirty="0" err="1"/>
+              <a:t>EmployeeCount</a:t>
+            </a:r>
+            <a:r>
+              <a:rPr lang="en-US" sz="1700" dirty="0"/>
+              <a:t>, </a:t>
+            </a:r>
+            <a:r>
+              <a:rPr lang="en-US" sz="1700" dirty="0" err="1"/>
+              <a:t>StandardHours</a:t>
+            </a:r>
+            <a:endParaRPr lang="en-US" sz="1700" dirty="0"/>
+          </a:p>
+          <a:p>
+            <a:r>
+              <a:rPr lang="en-US" sz="2100" dirty="0"/>
+              <a:t>Basis for Attrition model</a:t>
+            </a:r>
+          </a:p>
+          <a:p>
+            <a:r>
+              <a:rPr lang="en-US" sz="2000" dirty="0"/>
+              <a:t>Salary model dropped values with high VIF</a:t>
             </a:r>
           </a:p>
           <a:p>
             <a:pPr lvl="1"/>
             <a:r>
-              <a:rPr lang="en-US" dirty="0"/>
-              <a:t>HR Rep</a:t>
-            </a:r>
-          </a:p>
-          <a:p>
-            <a:pPr lvl="1"/>
+              <a:rPr lang="en-US" sz="1700" dirty="0"/>
+              <a:t>Age, </a:t>
+            </a:r>
+            <a:r>
+              <a:rPr lang="en-US" sz="1700" dirty="0" err="1"/>
+              <a:t>DistanceFromHome</a:t>
+            </a:r>
+            <a:r>
+              <a:rPr lang="en-US" sz="1700" dirty="0"/>
+              <a:t>, Department</a:t>
+            </a:r>
+          </a:p>
+          <a:p>
             <a:endParaRPr lang="en-US" dirty="0"/>
           </a:p>
         </p:txBody>
       </p:sp>
       <p:pic>
         <p:nvPicPr>
-          <p:cNvPr id="6" name="Picture 5">
+          <p:cNvPr id="8" name="Picture 7">
             <a:extLst>
               <a:ext uri="{FF2B5EF4-FFF2-40B4-BE49-F238E27FC236}">
-                <a16:creationId xmlns:a16="http://schemas.microsoft.com/office/drawing/2014/main" id="{4D8C78B9-CE1B-4141-9FDE-85982CD04A70}"/>
+                <a16:creationId xmlns:a16="http://schemas.microsoft.com/office/drawing/2014/main" id="{02B6E313-71FE-48D2-A0E8-24AFEC8190A2}"/>
               </a:ext>
             </a:extLst>
           </p:cNvPr>
@@ -8033,8 +8029,8 @@
         </p:blipFill>
         <p:spPr>
           <a:xfrm>
-            <a:off x="6595902" y="2955671"/>
-            <a:ext cx="5467776" cy="3124200"/>
+            <a:off x="6835588" y="3301252"/>
+            <a:ext cx="3576917" cy="2554941"/>
           </a:xfrm>
           <a:prstGeom prst="rect">
             <a:avLst/>
@@ -8044,7 +8040,7 @@
     </p:spTree>
     <p:extLst>
       <p:ext uri="{BB962C8B-B14F-4D97-AF65-F5344CB8AC3E}">
-        <p14:creationId xmlns:p14="http://schemas.microsoft.com/office/powerpoint/2010/main" val="2235351549"/>
+        <p14:creationId xmlns:p14="http://schemas.microsoft.com/office/powerpoint/2010/main" val="1102715832"/>
       </p:ext>
     </p:extLst>
   </p:cSld>
@@ -8125,39 +8121,78 @@
         </p:nvSpPr>
         <p:spPr>
           <a:xfrm>
-            <a:off x="2173288" y="2667000"/>
+            <a:off x="1961253" y="3048000"/>
             <a:ext cx="10018712" cy="3124200"/>
           </a:xfrm>
         </p:spPr>
         <p:txBody>
-          <a:bodyPr/>
-          <a:lstStyle/>
-          <a:p>
+          <a:bodyPr>
+            <a:normAutofit fontScale="85000" lnSpcReduction="20000"/>
+          </a:bodyPr>
+          <a:lstStyle/>
+          <a:p>
+            <a:r>
+              <a:rPr lang="en-US" sz="2200" dirty="0"/>
+              <a:t>Job Satisfaction by Title</a:t>
+            </a:r>
+          </a:p>
+          <a:p>
+            <a:pPr lvl="1"/>
+            <a:r>
+              <a:rPr lang="en-US" sz="1800" dirty="0"/>
+              <a:t>HR Representative</a:t>
+            </a:r>
+          </a:p>
+          <a:p>
+            <a:pPr lvl="1"/>
+            <a:r>
+              <a:rPr lang="en-US" sz="1800" dirty="0"/>
+              <a:t>Research Scientist</a:t>
+            </a:r>
+          </a:p>
+          <a:p>
+            <a:pPr lvl="1"/>
+            <a:r>
+              <a:rPr lang="en-US" sz="1800" dirty="0"/>
+              <a:t>Sales Executive</a:t>
+            </a:r>
+          </a:p>
+          <a:p>
+            <a:r>
+              <a:rPr lang="en-US" sz="2200" dirty="0"/>
+              <a:t>Job Satisfaction by Dept</a:t>
+            </a:r>
+          </a:p>
+          <a:p>
+            <a:pPr lvl="1"/>
             <a:r>
               <a:rPr lang="en-US" dirty="0"/>
-              <a:t>Age Buckets</a:t>
+              <a:t>HR</a:t>
             </a:r>
           </a:p>
           <a:p>
             <a:pPr lvl="1"/>
             <a:r>
               <a:rPr lang="en-US" dirty="0"/>
-              <a:t>35-44</a:t>
+              <a:t>Sales</a:t>
             </a:r>
           </a:p>
           <a:p>
             <a:pPr lvl="1"/>
             <a:r>
               <a:rPr lang="en-US" dirty="0"/>
-              <a:t>25-34</a:t>
+              <a:t>Research</a:t>
+            </a:r>
+          </a:p>
+          <a:p>
+            <a:r>
+              <a:rPr lang="en-US" sz="2200" dirty="0"/>
+              <a:t>Senior Leadership</a:t>
             </a:r>
           </a:p>
           <a:p>
             <a:pPr lvl="1"/>
-            <a:r>
-              <a:rPr lang="en-US" dirty="0"/>
-              <a:t>45-52</a:t>
-            </a:r>
+            <a:endParaRPr lang="en-US" dirty="0"/>
           </a:p>
           <a:p>
             <a:pPr lvl="1"/>
@@ -8167,55 +8202,38 @@
       </p:sp>
       <p:pic>
         <p:nvPicPr>
-          <p:cNvPr id="3076" name="Picture 4">
+          <p:cNvPr id="5" name="Picture 4">
             <a:extLst>
               <a:ext uri="{FF2B5EF4-FFF2-40B4-BE49-F238E27FC236}">
-                <a16:creationId xmlns:a16="http://schemas.microsoft.com/office/drawing/2014/main" id="{2C79AC4C-C5F1-41CF-99FE-B75C5A77CF35}"/>
+                <a16:creationId xmlns:a16="http://schemas.microsoft.com/office/drawing/2014/main" id="{BC5C52FC-4FB7-49F4-8798-42949F7BE297}"/>
               </a:ext>
             </a:extLst>
           </p:cNvPr>
           <p:cNvPicPr>
-            <a:picLocks noChangeAspect="1" noChangeArrowheads="1"/>
+            <a:picLocks noChangeAspect="1"/>
           </p:cNvPicPr>
           <p:nvPr/>
         </p:nvPicPr>
         <p:blipFill>
-          <a:blip r:embed="rId2">
-            <a:extLst>
-              <a:ext uri="{28A0092B-C50C-407E-A947-70E740481C1C}">
-                <a14:useLocalDpi xmlns:a14="http://schemas.microsoft.com/office/drawing/2010/main" val="0"/>
-              </a:ext>
-            </a:extLst>
-          </a:blip>
-          <a:srcRect/>
+          <a:blip r:embed="rId2"/>
           <a:stretch>
             <a:fillRect/>
           </a:stretch>
         </p:blipFill>
-        <p:spPr bwMode="auto">
+        <p:spPr>
           <a:xfrm>
-            <a:off x="6096000" y="2602966"/>
-            <a:ext cx="4996928" cy="3569234"/>
+            <a:off x="5648990" y="2853917"/>
+            <a:ext cx="5691334" cy="3512366"/>
           </a:xfrm>
           <a:prstGeom prst="rect">
             <a:avLst/>
           </a:prstGeom>
-          <a:noFill/>
-          <a:extLst>
-            <a:ext uri="{909E8E84-426E-40DD-AFC4-6F175D3DCCD1}">
-              <a14:hiddenFill xmlns:a14="http://schemas.microsoft.com/office/drawing/2010/main">
-                <a:solidFill>
-                  <a:srgbClr val="FFFFFF"/>
-                </a:solidFill>
-              </a14:hiddenFill>
-            </a:ext>
-          </a:extLst>
         </p:spPr>
       </p:pic>
     </p:spTree>
     <p:extLst>
       <p:ext uri="{BB962C8B-B14F-4D97-AF65-F5344CB8AC3E}">
-        <p14:creationId xmlns:p14="http://schemas.microsoft.com/office/powerpoint/2010/main" val="1291689581"/>
+        <p14:creationId xmlns:p14="http://schemas.microsoft.com/office/powerpoint/2010/main" val="1951416057"/>
       </p:ext>
     </p:extLst>
   </p:cSld>
@@ -8273,7 +8291,7 @@
           <a:p>
             <a:r>
               <a:rPr lang="en-US" dirty="0"/>
-              <a:t>Attrition Model</a:t>
+              <a:t>Interesting Trends in Data</a:t>
             </a:r>
           </a:p>
         </p:txBody>
@@ -8305,279 +8323,71 @@
           <a:lstStyle/>
           <a:p>
             <a:r>
-              <a:rPr lang="en-US" dirty="0"/>
-              <a:t>Naïve Bayes</a:t>
+              <a:rPr lang="en-US" sz="2000" dirty="0"/>
+              <a:t>Median Monthly Salary by Title</a:t>
             </a:r>
           </a:p>
           <a:p>
             <a:pPr lvl="1"/>
             <a:r>
-              <a:rPr lang="en-US" dirty="0"/>
-              <a:t>Calculate prior probability for given class </a:t>
+              <a:rPr lang="en-US" sz="1700" dirty="0"/>
+              <a:t>Manager </a:t>
             </a:r>
           </a:p>
           <a:p>
             <a:pPr lvl="1"/>
             <a:r>
-              <a:rPr lang="en-US" dirty="0"/>
-              <a:t>Find likelihood probability for each attribute</a:t>
+              <a:rPr lang="en-US" sz="1700" dirty="0"/>
+              <a:t>Research Director</a:t>
             </a:r>
           </a:p>
           <a:p>
             <a:pPr lvl="1"/>
             <a:r>
-              <a:rPr lang="en-US" dirty="0"/>
-              <a:t>Put values in Bayes</a:t>
-            </a:r>
-          </a:p>
-          <a:p>
-            <a:pPr lvl="2"/>
-            <a:r>
-              <a:rPr lang="en-US" dirty="0"/>
-              <a:t>Calculate Posterior probability</a:t>
+              <a:rPr lang="en-US" sz="1700" dirty="0"/>
+              <a:t>HR Rep</a:t>
             </a:r>
           </a:p>
           <a:p>
             <a:pPr lvl="1"/>
-            <a:r>
-              <a:rPr lang="en-US" dirty="0"/>
-              <a:t>See which class has higher probability</a:t>
-            </a:r>
-          </a:p>
-          <a:p>
-            <a:pPr lvl="1"/>
-            <a:endParaRPr lang="en-US" dirty="0"/>
-          </a:p>
-        </p:txBody>
-      </p:sp>
-      <p:sp>
-        <p:nvSpPr>
-          <p:cNvPr id="7" name="TextBox 6">
+            <a:endParaRPr lang="en-US" dirty="0"/>
+          </a:p>
+        </p:txBody>
+      </p:sp>
+      <p:pic>
+        <p:nvPicPr>
+          <p:cNvPr id="6" name="Picture 5">
             <a:extLst>
               <a:ext uri="{FF2B5EF4-FFF2-40B4-BE49-F238E27FC236}">
-                <a16:creationId xmlns:a16="http://schemas.microsoft.com/office/drawing/2014/main" id="{F423CC85-8558-46CD-BCF2-7004A8433A5C}"/>
+                <a16:creationId xmlns:a16="http://schemas.microsoft.com/office/drawing/2014/main" id="{4D8C78B9-CE1B-4141-9FDE-85982CD04A70}"/>
               </a:ext>
             </a:extLst>
           </p:cNvPr>
-          <p:cNvSpPr txBox="1"/>
+          <p:cNvPicPr>
+            <a:picLocks noChangeAspect="1"/>
+          </p:cNvPicPr>
           <p:nvPr/>
-        </p:nvSpPr>
+        </p:nvPicPr>
+        <p:blipFill>
+          <a:blip r:embed="rId2"/>
+          <a:stretch>
+            <a:fillRect/>
+          </a:stretch>
+        </p:blipFill>
         <p:spPr>
           <a:xfrm>
-            <a:off x="7916100" y="2142055"/>
-            <a:ext cx="2791589" cy="4555093"/>
+            <a:off x="6096000" y="3048000"/>
+            <a:ext cx="5467776" cy="3124200"/>
           </a:xfrm>
           <a:prstGeom prst="rect">
             <a:avLst/>
           </a:prstGeom>
-          <a:noFill/>
         </p:spPr>
-        <p:txBody>
-          <a:bodyPr wrap="square">
-            <a:spAutoFit/>
-          </a:bodyPr>
-          <a:lstStyle/>
-          <a:p>
-            <a:r>
-              <a:rPr lang="en-US" sz="1000" dirty="0"/>
-              <a:t> No Yes</a:t>
-            </a:r>
-          </a:p>
-          <a:p>
-            <a:r>
-              <a:rPr lang="en-US" sz="1000" dirty="0"/>
-              <a:t>  No  203  19</a:t>
-            </a:r>
-          </a:p>
-          <a:p>
-            <a:r>
-              <a:rPr lang="en-US" sz="1000" dirty="0"/>
-              <a:t>  Yes  20  19</a:t>
-            </a:r>
-          </a:p>
-          <a:p>
-            <a:r>
-              <a:rPr lang="en-US" sz="1000" dirty="0"/>
-              <a:t>Confusion Matrix and Statistics</a:t>
-            </a:r>
-          </a:p>
-          <a:p>
-            <a:endParaRPr lang="en-US" sz="1000" dirty="0"/>
-          </a:p>
-          <a:p>
-            <a:r>
-              <a:rPr lang="en-US" sz="1000" dirty="0"/>
-              <a:t>     </a:t>
-            </a:r>
-          </a:p>
-          <a:p>
-            <a:r>
-              <a:rPr lang="en-US" sz="1000" dirty="0"/>
-              <a:t>       No Yes</a:t>
-            </a:r>
-          </a:p>
-          <a:p>
-            <a:r>
-              <a:rPr lang="en-US" sz="1000" dirty="0"/>
-              <a:t>  No  203  19</a:t>
-            </a:r>
-          </a:p>
-          <a:p>
-            <a:r>
-              <a:rPr lang="en-US" sz="1000" dirty="0"/>
-              <a:t>  Yes  20  19</a:t>
-            </a:r>
-          </a:p>
-          <a:p>
-            <a:r>
-              <a:rPr lang="en-US" sz="1000" dirty="0"/>
-              <a:t>                                          </a:t>
-            </a:r>
-          </a:p>
-          <a:p>
-            <a:r>
-              <a:rPr lang="en-US" sz="1000" dirty="0"/>
-              <a:t>               Accuracy : 0.8506          </a:t>
-            </a:r>
-          </a:p>
-          <a:p>
-            <a:r>
-              <a:rPr lang="en-US" sz="1000" dirty="0"/>
-              <a:t>                 95% CI : (0.8014, 0.8915)</a:t>
-            </a:r>
-          </a:p>
-          <a:p>
-            <a:r>
-              <a:rPr lang="en-US" sz="1000" dirty="0"/>
-              <a:t>    No Information Rate : 0.8544          </a:t>
-            </a:r>
-          </a:p>
-          <a:p>
-            <a:r>
-              <a:rPr lang="en-US" sz="1000" dirty="0"/>
-              <a:t>    P-Value [Acc &gt; NIR] : 0.6112          </a:t>
-            </a:r>
-          </a:p>
-          <a:p>
-            <a:r>
-              <a:rPr lang="en-US" sz="1000" dirty="0"/>
-              <a:t>                                          </a:t>
-            </a:r>
-          </a:p>
-          <a:p>
-            <a:r>
-              <a:rPr lang="en-US" sz="1000" dirty="0"/>
-              <a:t>                  Kappa : 0.4059          </a:t>
-            </a:r>
-          </a:p>
-          <a:p>
-            <a:r>
-              <a:rPr lang="en-US" sz="1000" dirty="0"/>
-              <a:t>                                          </a:t>
-            </a:r>
-          </a:p>
-          <a:p>
-            <a:r>
-              <a:rPr lang="en-US" sz="1000" dirty="0"/>
-              <a:t> </a:t>
-            </a:r>
-            <a:r>
-              <a:rPr lang="en-US" sz="1000" dirty="0" err="1"/>
-              <a:t>Mcnemar's</a:t>
-            </a:r>
-            <a:r>
-              <a:rPr lang="en-US" sz="1000" dirty="0"/>
-              <a:t> Test P-Value : 1.0000          </a:t>
-            </a:r>
-          </a:p>
-          <a:p>
-            <a:r>
-              <a:rPr lang="en-US" sz="1000" dirty="0"/>
-              <a:t>                                          </a:t>
-            </a:r>
-          </a:p>
-          <a:p>
-            <a:r>
-              <a:rPr lang="en-US" sz="1000" dirty="0"/>
-              <a:t>            Sensitivity : 0.9103          </a:t>
-            </a:r>
-          </a:p>
-          <a:p>
-            <a:r>
-              <a:rPr lang="en-US" sz="1000" dirty="0"/>
-              <a:t>            Specificity : 0.5000          </a:t>
-            </a:r>
-          </a:p>
-          <a:p>
-            <a:r>
-              <a:rPr lang="en-US" sz="1000" dirty="0"/>
-              <a:t>         Pos </a:t>
-            </a:r>
-            <a:r>
-              <a:rPr lang="en-US" sz="1000" dirty="0" err="1"/>
-              <a:t>Pred</a:t>
-            </a:r>
-            <a:r>
-              <a:rPr lang="en-US" sz="1000" dirty="0"/>
-              <a:t> Value : 0.9144          </a:t>
-            </a:r>
-          </a:p>
-          <a:p>
-            <a:r>
-              <a:rPr lang="en-US" sz="1000" dirty="0"/>
-              <a:t>         Neg </a:t>
-            </a:r>
-            <a:r>
-              <a:rPr lang="en-US" sz="1000" dirty="0" err="1"/>
-              <a:t>Pred</a:t>
-            </a:r>
-            <a:r>
-              <a:rPr lang="en-US" sz="1000" dirty="0"/>
-              <a:t> Value : 0.4872          </a:t>
-            </a:r>
-          </a:p>
-          <a:p>
-            <a:r>
-              <a:rPr lang="en-US" sz="1000" dirty="0"/>
-              <a:t>             Prevalence : 0.8544          </a:t>
-            </a:r>
-          </a:p>
-          <a:p>
-            <a:r>
-              <a:rPr lang="en-US" sz="1000" dirty="0"/>
-              <a:t>         Detection Rate : 0.7778          </a:t>
-            </a:r>
-          </a:p>
-          <a:p>
-            <a:r>
-              <a:rPr lang="en-US" sz="1000" dirty="0"/>
-              <a:t>   Detection Prevalence : 0.8506          </a:t>
-            </a:r>
-          </a:p>
-          <a:p>
-            <a:r>
-              <a:rPr lang="en-US" sz="1000" dirty="0"/>
-              <a:t>      Balanced Accuracy : 0.7052          </a:t>
-            </a:r>
-          </a:p>
-          <a:p>
-            <a:r>
-              <a:rPr lang="en-US" sz="1000" dirty="0"/>
-              <a:t>                                          </a:t>
-            </a:r>
-          </a:p>
-          <a:p>
-            <a:r>
-              <a:rPr lang="en-US" sz="1000" dirty="0"/>
-              <a:t>       'Positive' Class : No </a:t>
-            </a:r>
-          </a:p>
-        </p:txBody>
-      </p:sp>
+      </p:pic>
     </p:spTree>
     <p:extLst>
       <p:ext uri="{BB962C8B-B14F-4D97-AF65-F5344CB8AC3E}">
-        <p14:creationId xmlns:p14="http://schemas.microsoft.com/office/powerpoint/2010/main" val="2159929733"/>
+        <p14:creationId xmlns:p14="http://schemas.microsoft.com/office/powerpoint/2010/main" val="2235351549"/>
       </p:ext>
     </p:extLst>
   </p:cSld>
@@ -8658,7 +8468,7 @@
         </p:nvSpPr>
         <p:spPr>
           <a:xfrm>
-            <a:off x="2173288" y="2667000"/>
+            <a:off x="1603444" y="2683564"/>
             <a:ext cx="10018712" cy="3124200"/>
           </a:xfrm>
         </p:spPr>
@@ -8667,270 +8477,130 @@
           <a:lstStyle/>
           <a:p>
             <a:r>
-              <a:rPr lang="en-US" dirty="0"/>
-              <a:t>Random Forest</a:t>
+              <a:rPr lang="en-US" sz="2000" dirty="0"/>
+              <a:t>Naïve Bayes</a:t>
             </a:r>
           </a:p>
           <a:p>
             <a:pPr lvl="1"/>
             <a:r>
-              <a:rPr lang="en-US" dirty="0"/>
-              <a:t>Select Random samples from Attrition</a:t>
+              <a:rPr lang="en-US" sz="1700" dirty="0"/>
+              <a:t>Calculate prior probability for given class </a:t>
             </a:r>
           </a:p>
           <a:p>
             <a:pPr lvl="1"/>
             <a:r>
-              <a:rPr lang="en-US" dirty="0"/>
-              <a:t>Construct Decision Tree for each sample</a:t>
+              <a:rPr lang="en-US" sz="1700" dirty="0"/>
+              <a:t>Find likelihood probability for each attribute</a:t>
+            </a:r>
+          </a:p>
+          <a:p>
+            <a:pPr lvl="1"/>
+            <a:r>
+              <a:rPr lang="en-US" sz="1700" dirty="0"/>
+              <a:t>Put values in Bayes</a:t>
             </a:r>
           </a:p>
           <a:p>
             <a:pPr lvl="2"/>
             <a:r>
-              <a:rPr lang="en-US" dirty="0"/>
-              <a:t>Prediction result from each decision</a:t>
+              <a:rPr lang="en-US" sz="1500" dirty="0"/>
+              <a:t>Calculate Posterior probability</a:t>
             </a:r>
           </a:p>
           <a:p>
             <a:pPr lvl="1"/>
             <a:r>
-              <a:rPr lang="en-US" dirty="0"/>
-              <a:t>Perform a vote for each predicted result</a:t>
+              <a:rPr lang="en-US" sz="1700" dirty="0"/>
+              <a:t>See which class has higher probability</a:t>
             </a:r>
           </a:p>
           <a:p>
             <a:pPr lvl="1"/>
-            <a:r>
-              <a:rPr lang="en-US" dirty="0"/>
-              <a:t>Select Prediction result with most votes</a:t>
-            </a:r>
-          </a:p>
-          <a:p>
-            <a:pPr lvl="1"/>
-            <a:endParaRPr lang="en-US" dirty="0"/>
-          </a:p>
-          <a:p>
-            <a:pPr lvl="1"/>
-            <a:endParaRPr lang="en-US" dirty="0"/>
-          </a:p>
-        </p:txBody>
-      </p:sp>
-      <p:sp>
-        <p:nvSpPr>
-          <p:cNvPr id="6" name="TextBox 5">
+            <a:endParaRPr lang="en-US" dirty="0"/>
+          </a:p>
+        </p:txBody>
+      </p:sp>
+      <p:sp>
+        <p:nvSpPr>
+          <p:cNvPr id="5" name="AutoShape 2">
             <a:extLst>
               <a:ext uri="{FF2B5EF4-FFF2-40B4-BE49-F238E27FC236}">
-                <a16:creationId xmlns:a16="http://schemas.microsoft.com/office/drawing/2014/main" id="{2058985C-5A38-4115-9B33-673FE0399B51}"/>
+                <a16:creationId xmlns:a16="http://schemas.microsoft.com/office/drawing/2014/main" id="{BF20A171-E9F5-4E55-B820-90203BE76C09}"/>
               </a:ext>
             </a:extLst>
           </p:cNvPr>
-          <p:cNvSpPr txBox="1"/>
+          <p:cNvSpPr>
+            <a:spLocks noChangeAspect="1" noChangeArrowheads="1"/>
+          </p:cNvSpPr>
           <p:nvPr/>
         </p:nvSpPr>
-        <p:spPr>
+        <p:spPr bwMode="auto">
           <a:xfrm>
-            <a:off x="7896076" y="2105441"/>
-            <a:ext cx="2811613" cy="4247317"/>
+            <a:off x="5943600" y="3276600"/>
+            <a:ext cx="304800" cy="304800"/>
           </a:xfrm>
           <a:prstGeom prst="rect">
             <a:avLst/>
           </a:prstGeom>
           <a:noFill/>
+          <a:extLst>
+            <a:ext uri="{909E8E84-426E-40DD-AFC4-6F175D3DCCD1}">
+              <a14:hiddenFill xmlns:a14="http://schemas.microsoft.com/office/drawing/2010/main">
+                <a:solidFill>
+                  <a:srgbClr val="FFFFFF"/>
+                </a:solidFill>
+              </a14:hiddenFill>
+            </a:ext>
+          </a:extLst>
         </p:spPr>
         <p:txBody>
-          <a:bodyPr wrap="square">
-            <a:spAutoFit/>
+          <a:bodyPr vert="horz" wrap="square" lIns="91440" tIns="45720" rIns="91440" bIns="45720" numCol="1" anchor="t" anchorCtr="0" compatLnSpc="1">
+            <a:prstTxWarp prst="textNoShape">
+              <a:avLst/>
+            </a:prstTxWarp>
           </a:bodyPr>
           <a:lstStyle/>
           <a:p>
-            <a:r>
-              <a:rPr lang="en-US" sz="1000" dirty="0"/>
-              <a:t>Confusion Matrix and Statistics</a:t>
-            </a:r>
-          </a:p>
-          <a:p>
-            <a:endParaRPr lang="en-US" sz="1000" dirty="0"/>
-          </a:p>
-          <a:p>
-            <a:r>
-              <a:rPr lang="en-US" sz="1000" dirty="0"/>
-              <a:t>     </a:t>
-            </a:r>
-            <a:r>
-              <a:rPr lang="en-US" sz="1000" dirty="0" err="1"/>
-              <a:t>predTrain</a:t>
-            </a:r>
-            <a:endParaRPr lang="en-US" sz="1000" dirty="0"/>
-          </a:p>
-          <a:p>
-            <a:r>
-              <a:rPr lang="en-US" sz="1000" dirty="0"/>
-              <a:t>       No Yes</a:t>
-            </a:r>
-          </a:p>
-          <a:p>
-            <a:r>
-              <a:rPr lang="en-US" sz="1000" dirty="0"/>
-              <a:t>  No  220   3</a:t>
-            </a:r>
-          </a:p>
-          <a:p>
-            <a:r>
-              <a:rPr lang="en-US" sz="1000" dirty="0"/>
-              <a:t>  Yes  31   7</a:t>
-            </a:r>
-          </a:p>
-          <a:p>
-            <a:r>
-              <a:rPr lang="en-US" sz="1000" dirty="0"/>
-              <a:t>                                          </a:t>
-            </a:r>
-          </a:p>
-          <a:p>
-            <a:r>
-              <a:rPr lang="en-US" sz="1000" dirty="0"/>
-              <a:t>               Accuracy : 0.8697          </a:t>
-            </a:r>
-          </a:p>
-          <a:p>
-            <a:r>
-              <a:rPr lang="en-US" sz="1000" dirty="0"/>
-              <a:t>                 95% CI : (0.8227, 0.9081)</a:t>
-            </a:r>
-          </a:p>
-          <a:p>
-            <a:r>
-              <a:rPr lang="en-US" sz="1000" dirty="0"/>
-              <a:t>    No Information Rate : 0.9617          </a:t>
-            </a:r>
-          </a:p>
-          <a:p>
-            <a:r>
-              <a:rPr lang="en-US" sz="1000" dirty="0"/>
-              <a:t>    P-Value [Acc &gt; NIR] : 1               </a:t>
-            </a:r>
-          </a:p>
-          <a:p>
-            <a:r>
-              <a:rPr lang="en-US" sz="1000" dirty="0"/>
-              <a:t>                                          </a:t>
-            </a:r>
-          </a:p>
-          <a:p>
-            <a:r>
-              <a:rPr lang="en-US" sz="1000" dirty="0"/>
-              <a:t>                  Kappa : 0.2459          </a:t>
-            </a:r>
-          </a:p>
-          <a:p>
-            <a:r>
-              <a:rPr lang="en-US" sz="1000" dirty="0"/>
-              <a:t>                                          </a:t>
-            </a:r>
-          </a:p>
-          <a:p>
-            <a:r>
-              <a:rPr lang="en-US" sz="1000" dirty="0"/>
-              <a:t> </a:t>
-            </a:r>
-            <a:r>
-              <a:rPr lang="en-US" sz="1000" dirty="0" err="1"/>
-              <a:t>Mcnemar's</a:t>
-            </a:r>
-            <a:r>
-              <a:rPr lang="en-US" sz="1000" dirty="0"/>
-              <a:t> Test P-Value : 0.000003649     </a:t>
-            </a:r>
-          </a:p>
-          <a:p>
-            <a:r>
-              <a:rPr lang="en-US" sz="1000" dirty="0"/>
-              <a:t>                                          </a:t>
-            </a:r>
-          </a:p>
-          <a:p>
-            <a:r>
-              <a:rPr lang="en-US" sz="1000" dirty="0"/>
-              <a:t>            Sensitivity : 0.8765          </a:t>
-            </a:r>
-          </a:p>
-          <a:p>
-            <a:r>
-              <a:rPr lang="en-US" sz="1000" dirty="0"/>
-              <a:t>            Specificity : 0.7000          </a:t>
-            </a:r>
-          </a:p>
-          <a:p>
-            <a:r>
-              <a:rPr lang="en-US" sz="1000" dirty="0"/>
-              <a:t>         Pos </a:t>
-            </a:r>
-            <a:r>
-              <a:rPr lang="en-US" sz="1000" dirty="0" err="1"/>
-              <a:t>Pred</a:t>
-            </a:r>
-            <a:r>
-              <a:rPr lang="en-US" sz="1000" dirty="0"/>
-              <a:t> Value : 0.9865          </a:t>
-            </a:r>
-          </a:p>
-          <a:p>
-            <a:r>
-              <a:rPr lang="en-US" sz="1000" dirty="0"/>
-              <a:t>         Neg </a:t>
-            </a:r>
-            <a:r>
-              <a:rPr lang="en-US" sz="1000" dirty="0" err="1"/>
-              <a:t>Pred</a:t>
-            </a:r>
-            <a:r>
-              <a:rPr lang="en-US" sz="1000" dirty="0"/>
-              <a:t> Value : 0.1842          </a:t>
-            </a:r>
-          </a:p>
-          <a:p>
-            <a:r>
-              <a:rPr lang="en-US" sz="1000" dirty="0"/>
-              <a:t>             Prevalence : 0.9617          </a:t>
-            </a:r>
-          </a:p>
-          <a:p>
-            <a:r>
-              <a:rPr lang="en-US" sz="1000" dirty="0"/>
-              <a:t>         Detection Rate : 0.8429          </a:t>
-            </a:r>
-          </a:p>
-          <a:p>
-            <a:r>
-              <a:rPr lang="en-US" sz="1000" dirty="0"/>
-              <a:t>   Detection Prevalence : 0.8544          </a:t>
-            </a:r>
-          </a:p>
-          <a:p>
-            <a:r>
-              <a:rPr lang="en-US" sz="1000" dirty="0"/>
-              <a:t>      Balanced Accuracy : 0.7882          </a:t>
-            </a:r>
-          </a:p>
-          <a:p>
-            <a:r>
-              <a:rPr lang="en-US" sz="1000" dirty="0"/>
-              <a:t>                                          </a:t>
-            </a:r>
-          </a:p>
-          <a:p>
-            <a:r>
-              <a:rPr lang="en-US" sz="1000" dirty="0"/>
-              <a:t>       'Positive' Class : No </a:t>
-            </a:r>
-          </a:p>
-        </p:txBody>
-      </p:sp>
+            <a:endParaRPr lang="en-US"/>
+          </a:p>
+        </p:txBody>
+      </p:sp>
+      <p:pic>
+        <p:nvPicPr>
+          <p:cNvPr id="6" name="Picture 5">
+            <a:extLst>
+              <a:ext uri="{FF2B5EF4-FFF2-40B4-BE49-F238E27FC236}">
+                <a16:creationId xmlns:a16="http://schemas.microsoft.com/office/drawing/2014/main" id="{FB4F5033-974B-49C8-9091-4A499CDE12D4}"/>
+              </a:ext>
+            </a:extLst>
+          </p:cNvPr>
+          <p:cNvPicPr>
+            <a:picLocks noChangeAspect="1"/>
+          </p:cNvPicPr>
+          <p:nvPr/>
+        </p:nvPicPr>
+        <p:blipFill>
+          <a:blip r:embed="rId2"/>
+          <a:stretch>
+            <a:fillRect/>
+          </a:stretch>
+        </p:blipFill>
+        <p:spPr>
+          <a:xfrm>
+            <a:off x="6612800" y="2438399"/>
+            <a:ext cx="4373880" cy="3124200"/>
+          </a:xfrm>
+          <a:prstGeom prst="rect">
+            <a:avLst/>
+          </a:prstGeom>
+        </p:spPr>
+      </p:pic>
     </p:spTree>
     <p:extLst>
       <p:ext uri="{BB962C8B-B14F-4D97-AF65-F5344CB8AC3E}">
-        <p14:creationId xmlns:p14="http://schemas.microsoft.com/office/powerpoint/2010/main" val="1845796925"/>
+        <p14:creationId xmlns:p14="http://schemas.microsoft.com/office/powerpoint/2010/main" val="2159929733"/>
       </p:ext>
     </p:extLst>
   </p:cSld>

</xml_diff>